<commit_message>
UG & PPP Update
</commit_message>
<xml_diff>
--- a/docs/diagrams/AddFeatureFileCheck.pptx
+++ b/docs/diagrams/AddFeatureFileCheck.pptx
@@ -108,6 +108,11 @@
       </a:defRPr>
     </a:lvl9pPr>
   </p:defaultTextStyle>
+  <p:extLst>
+    <p:ext uri="{EFAFB233-063F-42B5-8137-9DF3F51BA10A}">
+      <p15:sldGuideLst xmlns:p15="http://schemas.microsoft.com/office/powerpoint/2012/main"/>
+    </p:ext>
+  </p:extLst>
 </p:presentation>
 </file>
 
@@ -260,7 +265,7 @@
           <a:p>
             <a:fld id="{EA8B080E-ECE2-4244-A349-735E56644920}" type="datetimeFigureOut">
               <a:rPr lang="en-SG" smtClean="0"/>
-              <a:t>20/3/2019</a:t>
+              <a:t>15/4/19</a:t>
             </a:fld>
             <a:endParaRPr lang="en-SG"/>
           </a:p>
@@ -460,7 +465,7 @@
           <a:p>
             <a:fld id="{EA8B080E-ECE2-4244-A349-735E56644920}" type="datetimeFigureOut">
               <a:rPr lang="en-SG" smtClean="0"/>
-              <a:t>20/3/2019</a:t>
+              <a:t>15/4/19</a:t>
             </a:fld>
             <a:endParaRPr lang="en-SG"/>
           </a:p>
@@ -670,7 +675,7 @@
           <a:p>
             <a:fld id="{EA8B080E-ECE2-4244-A349-735E56644920}" type="datetimeFigureOut">
               <a:rPr lang="en-SG" smtClean="0"/>
-              <a:t>20/3/2019</a:t>
+              <a:t>15/4/19</a:t>
             </a:fld>
             <a:endParaRPr lang="en-SG"/>
           </a:p>
@@ -870,7 +875,7 @@
           <a:p>
             <a:fld id="{EA8B080E-ECE2-4244-A349-735E56644920}" type="datetimeFigureOut">
               <a:rPr lang="en-SG" smtClean="0"/>
-              <a:t>20/3/2019</a:t>
+              <a:t>15/4/19</a:t>
             </a:fld>
             <a:endParaRPr lang="en-SG"/>
           </a:p>
@@ -1146,7 +1151,7 @@
           <a:p>
             <a:fld id="{EA8B080E-ECE2-4244-A349-735E56644920}" type="datetimeFigureOut">
               <a:rPr lang="en-SG" smtClean="0"/>
-              <a:t>20/3/2019</a:t>
+              <a:t>15/4/19</a:t>
             </a:fld>
             <a:endParaRPr lang="en-SG"/>
           </a:p>
@@ -1414,7 +1419,7 @@
           <a:p>
             <a:fld id="{EA8B080E-ECE2-4244-A349-735E56644920}" type="datetimeFigureOut">
               <a:rPr lang="en-SG" smtClean="0"/>
-              <a:t>20/3/2019</a:t>
+              <a:t>15/4/19</a:t>
             </a:fld>
             <a:endParaRPr lang="en-SG"/>
           </a:p>
@@ -1829,7 +1834,7 @@
           <a:p>
             <a:fld id="{EA8B080E-ECE2-4244-A349-735E56644920}" type="datetimeFigureOut">
               <a:rPr lang="en-SG" smtClean="0"/>
-              <a:t>20/3/2019</a:t>
+              <a:t>15/4/19</a:t>
             </a:fld>
             <a:endParaRPr lang="en-SG"/>
           </a:p>
@@ -1971,7 +1976,7 @@
           <a:p>
             <a:fld id="{EA8B080E-ECE2-4244-A349-735E56644920}" type="datetimeFigureOut">
               <a:rPr lang="en-SG" smtClean="0"/>
-              <a:t>20/3/2019</a:t>
+              <a:t>15/4/19</a:t>
             </a:fld>
             <a:endParaRPr lang="en-SG"/>
           </a:p>
@@ -2084,7 +2089,7 @@
           <a:p>
             <a:fld id="{EA8B080E-ECE2-4244-A349-735E56644920}" type="datetimeFigureOut">
               <a:rPr lang="en-SG" smtClean="0"/>
-              <a:t>20/3/2019</a:t>
+              <a:t>15/4/19</a:t>
             </a:fld>
             <a:endParaRPr lang="en-SG"/>
           </a:p>
@@ -2397,7 +2402,7 @@
           <a:p>
             <a:fld id="{EA8B080E-ECE2-4244-A349-735E56644920}" type="datetimeFigureOut">
               <a:rPr lang="en-SG" smtClean="0"/>
-              <a:t>20/3/2019</a:t>
+              <a:t>15/4/19</a:t>
             </a:fld>
             <a:endParaRPr lang="en-SG"/>
           </a:p>
@@ -2686,7 +2691,7 @@
           <a:p>
             <a:fld id="{EA8B080E-ECE2-4244-A349-735E56644920}" type="datetimeFigureOut">
               <a:rPr lang="en-SG" smtClean="0"/>
-              <a:t>20/3/2019</a:t>
+              <a:t>15/4/19</a:t>
             </a:fld>
             <a:endParaRPr lang="en-SG"/>
           </a:p>
@@ -2929,7 +2934,7 @@
           <a:p>
             <a:fld id="{EA8B080E-ECE2-4244-A349-735E56644920}" type="datetimeFigureOut">
               <a:rPr lang="en-SG" smtClean="0"/>
-              <a:t>20/3/2019</a:t>
+              <a:t>15/4/19</a:t>
             </a:fld>
             <a:endParaRPr lang="en-SG"/>
           </a:p>
@@ -3504,15 +3509,22 @@
           </p:cNvPicPr>
           <p:nvPr/>
         </p:nvPicPr>
-        <p:blipFill rotWithShape="1">
-          <a:blip r:embed="rId2"/>
-          <a:srcRect l="32477" t="7771" r="8774" b="20530"/>
-          <a:stretch/>
+        <p:blipFill>
+          <a:blip r:embed="rId2">
+            <a:extLst>
+              <a:ext uri="{28A0092B-C50C-407E-A947-70E740481C1C}">
+                <a14:useLocalDpi xmlns:a14="http://schemas.microsoft.com/office/drawing/2010/main" val="0"/>
+              </a:ext>
+            </a:extLst>
+          </a:blip>
+          <a:stretch>
+            <a:fillRect/>
+          </a:stretch>
         </p:blipFill>
         <p:spPr>
           <a:xfrm>
-            <a:off x="4293440" y="532895"/>
-            <a:ext cx="6043519" cy="4917172"/>
+            <a:off x="4660218" y="532895"/>
+            <a:ext cx="5309963" cy="4917172"/>
           </a:xfrm>
           <a:prstGeom prst="rect">
             <a:avLst/>
@@ -4672,8 +4684,13 @@
             <a:pPr algn="ctr"/>
             <a:r>
               <a:rPr lang="en-US" sz="1400" dirty="0"/>
-              <a:t>for serocks.pdf</a:t>
-            </a:r>
+              <a:t>for </a:t>
+            </a:r>
+            <a:r>
+              <a:rPr lang="en-US" sz="1400" dirty="0" err="1"/>
+              <a:t>m.pdf</a:t>
+            </a:r>
+            <a:endParaRPr lang="en-US" sz="1400" dirty="0"/>
           </a:p>
         </p:txBody>
       </p:sp>
@@ -4738,7 +4755,6 @@
           <p:cNvCxnSpPr>
             <a:cxnSpLocks/>
             <a:stCxn id="9" idx="2"/>
-            <a:endCxn id="23" idx="3"/>
           </p:cNvCxnSpPr>
           <p:nvPr/>
         </p:nvCxnSpPr>
@@ -4944,7 +4960,7 @@
                 <a:latin typeface="Roboto Mono for Powerline" pitchFamily="2" charset="0"/>
                 <a:ea typeface="Roboto Mono for Powerline" pitchFamily="2" charset="0"/>
               </a:rPr>
-              <a:t>DuplicatePDF</a:t>
+              <a:t>PDFNotFound</a:t>
             </a:r>
             <a:endParaRPr lang="en-US" sz="1400" dirty="0">
               <a:latin typeface="Roboto Mono for Powerline" pitchFamily="2" charset="0"/>
@@ -4987,6 +5003,50 @@
           <a:ln w="28575">
             <a:solidFill>
               <a:srgbClr val="C00000"/>
+            </a:solidFill>
+            <a:tailEnd type="triangle"/>
+          </a:ln>
+        </p:spPr>
+        <p:style>
+          <a:lnRef idx="1">
+            <a:schemeClr val="accent1"/>
+          </a:lnRef>
+          <a:fillRef idx="0">
+            <a:schemeClr val="accent1"/>
+          </a:fillRef>
+          <a:effectRef idx="0">
+            <a:schemeClr val="accent1"/>
+          </a:effectRef>
+          <a:fontRef idx="minor">
+            <a:schemeClr val="tx1"/>
+          </a:fontRef>
+        </p:style>
+      </p:cxnSp>
+      <p:cxnSp>
+        <p:nvCxnSpPr>
+          <p:cNvPr id="26" name="Straight Arrow Connector 25">
+            <a:extLst>
+              <a:ext uri="{FF2B5EF4-FFF2-40B4-BE49-F238E27FC236}">
+                <a16:creationId xmlns:a16="http://schemas.microsoft.com/office/drawing/2014/main" id="{ECF41038-8A96-4B00-BA33-7303F4F99879}"/>
+              </a:ext>
+            </a:extLst>
+          </p:cNvPr>
+          <p:cNvCxnSpPr>
+            <a:cxnSpLocks/>
+          </p:cNvCxnSpPr>
+          <p:nvPr/>
+        </p:nvCxnSpPr>
+        <p:spPr>
+          <a:xfrm flipV="1">
+            <a:off x="4217050" y="1877806"/>
+            <a:ext cx="0" cy="1000993"/>
+          </a:xfrm>
+          <a:prstGeom prst="straightConnector1">
+            <a:avLst/>
+          </a:prstGeom>
+          <a:ln w="28575">
+            <a:solidFill>
+              <a:schemeClr val="tx1"/>
             </a:solidFill>
             <a:tailEnd type="triangle"/>
           </a:ln>
@@ -5008,10 +5068,10 @@
       </p:cxnSp>
       <p:pic>
         <p:nvPicPr>
-          <p:cNvPr id="23" name="Picture 22">
-            <a:extLst>
-              <a:ext uri="{FF2B5EF4-FFF2-40B4-BE49-F238E27FC236}">
-                <a16:creationId xmlns:a16="http://schemas.microsoft.com/office/drawing/2014/main" id="{2D9B4196-A97C-4CEC-A211-E42AD7C859CF}"/>
+          <p:cNvPr id="3" name="Picture 2">
+            <a:extLst>
+              <a:ext uri="{FF2B5EF4-FFF2-40B4-BE49-F238E27FC236}">
+                <a16:creationId xmlns:a16="http://schemas.microsoft.com/office/drawing/2014/main" id="{9EB47D21-4D3A-4747-8BC2-4454813924C9}"/>
               </a:ext>
             </a:extLst>
           </p:cNvPr>
@@ -5020,66 +5080,28 @@
           </p:cNvPicPr>
           <p:nvPr/>
         </p:nvPicPr>
-        <p:blipFill rotWithShape="1">
-          <a:blip r:embed="rId3"/>
-          <a:srcRect l="32363" t="7620" r="8731" b="20528"/>
-          <a:stretch/>
+        <p:blipFill>
+          <a:blip r:embed="rId3">
+            <a:extLst>
+              <a:ext uri="{28A0092B-C50C-407E-A947-70E740481C1C}">
+                <a14:useLocalDpi xmlns:a14="http://schemas.microsoft.com/office/drawing/2010/main" val="0"/>
+              </a:ext>
+            </a:extLst>
+          </a:blip>
+          <a:stretch>
+            <a:fillRect/>
+          </a:stretch>
         </p:blipFill>
         <p:spPr>
           <a:xfrm>
-            <a:off x="1865168" y="2878799"/>
-            <a:ext cx="4703764" cy="3824976"/>
+            <a:off x="2465455" y="2890466"/>
+            <a:ext cx="4105326" cy="3801644"/>
           </a:xfrm>
           <a:prstGeom prst="rect">
             <a:avLst/>
           </a:prstGeom>
         </p:spPr>
       </p:pic>
-      <p:cxnSp>
-        <p:nvCxnSpPr>
-          <p:cNvPr id="26" name="Straight Arrow Connector 25">
-            <a:extLst>
-              <a:ext uri="{FF2B5EF4-FFF2-40B4-BE49-F238E27FC236}">
-                <a16:creationId xmlns:a16="http://schemas.microsoft.com/office/drawing/2014/main" id="{ECF41038-8A96-4B00-BA33-7303F4F99879}"/>
-              </a:ext>
-            </a:extLst>
-          </p:cNvPr>
-          <p:cNvCxnSpPr>
-            <a:cxnSpLocks/>
-            <a:stCxn id="23" idx="0"/>
-          </p:cNvCxnSpPr>
-          <p:nvPr/>
-        </p:nvCxnSpPr>
-        <p:spPr>
-          <a:xfrm flipV="1">
-            <a:off x="4217050" y="1877806"/>
-            <a:ext cx="0" cy="1000993"/>
-          </a:xfrm>
-          <a:prstGeom prst="straightConnector1">
-            <a:avLst/>
-          </a:prstGeom>
-          <a:ln w="28575">
-            <a:solidFill>
-              <a:schemeClr val="tx1"/>
-            </a:solidFill>
-            <a:tailEnd type="triangle"/>
-          </a:ln>
-        </p:spPr>
-        <p:style>
-          <a:lnRef idx="1">
-            <a:schemeClr val="accent1"/>
-          </a:lnRef>
-          <a:fillRef idx="0">
-            <a:schemeClr val="accent1"/>
-          </a:fillRef>
-          <a:effectRef idx="0">
-            <a:schemeClr val="accent1"/>
-          </a:effectRef>
-          <a:fontRef idx="minor">
-            <a:schemeClr val="tx1"/>
-          </a:fontRef>
-        </p:style>
-      </p:cxnSp>
     </p:spTree>
     <p:extLst>
       <p:ext uri="{BB962C8B-B14F-4D97-AF65-F5344CB8AC3E}">

</xml_diff>